<commit_message>
Simplified logic for top-node processing
</commit_message>
<xml_diff>
--- a/output.pptx
+++ b/output.pptx
@@ -3123,24 +3123,36 @@
             </a:r>
           </a:p>
           <a:p>
+            <a:pPr>
+              <a:buNone/>
+            </a:pPr>
             <a:r>
               <a:rPr lang="en-US" b="true"/>
               <a:t>Bold</a:t>
             </a:r>
           </a:p>
           <a:p>
-            <a:r>
-              <a:rPr lang="en-US"/>
+            <a:pPr>
+              <a:buNone/>
+            </a:pPr>
+            <a:r>
+              <a:rPr lang="en-US" u="sng"/>
               <a:t>Item one</a:t>
             </a:r>
           </a:p>
           <a:p>
-            <a:r>
-              <a:rPr lang="en-US"/>
+            <a:pPr>
+              <a:buNone/>
+            </a:pPr>
+            <a:r>
+              <a:rPr lang="en-US" b="true" u="sng"/>
               <a:t>Item two</a:t>
             </a:r>
           </a:p>
           <a:p>
+            <a:pPr>
+              <a:buNone/>
+            </a:pPr>
             <a:r>
               <a:rPr lang="en-US"/>
               <a:t>Item three</a:t>

</xml_diff>

<commit_message>
Support strong, em, and ol tags
</commit_message>
<xml_diff>
--- a/output.pptx
+++ b/output.pptx
@@ -3098,6 +3098,47 @@
           <a:lstStyle/>
           <a:p>
             <a:pPr>
+              <a:buAutoNum type="arabicPeriod" startAt="1"/>
+            </a:pPr>
+            <a:r>
+              <a:rPr lang="en-US"/>
+              <a:t>a</a:t>
+            </a:r>
+          </a:p>
+          <a:p>
+            <a:pPr>
+              <a:buAutoNum type="arabicPeriod" startAt="1"/>
+            </a:pPr>
+            <a:r>
+              <a:rPr lang="en-US"/>
+              <a:t>b</a:t>
+            </a:r>
+          </a:p>
+          <a:p>
+            <a:pPr>
+              <a:buAutoNum type="arabicPeriod" startAt="1"/>
+            </a:pPr>
+            <a:r>
+              <a:rPr lang="en-US"/>
+              <a:t>c</a:t>
+            </a:r>
+          </a:p>
+          <a:p>
+            <a:pPr>
+              <a:buAutoNum type="arabicPeriod" startAt="1"/>
+            </a:pPr>
+            <a:r>
+              <a:rPr lang="en-US"/>
+              <a:t>d</a:t>
+            </a:r>
+          </a:p>
+          <a:p>
+            <a:pPr>
+              <a:buNone/>
+            </a:pPr>
+          </a:p>
+          <a:p>
+            <a:pPr>
               <a:buNone/>
             </a:pPr>
             <a:r>
@@ -3132,27 +3173,18 @@
             </a:r>
           </a:p>
           <a:p>
-            <a:pPr>
-              <a:buNone/>
-            </a:pPr>
             <a:r>
               <a:rPr lang="en-US" u="sng"/>
               <a:t>Item one</a:t>
             </a:r>
           </a:p>
           <a:p>
-            <a:pPr>
-              <a:buNone/>
-            </a:pPr>
             <a:r>
               <a:rPr lang="en-US" b="true" u="sng"/>
               <a:t>Item two</a:t>
             </a:r>
           </a:p>
           <a:p>
-            <a:pPr>
-              <a:buNone/>
-            </a:pPr>
             <a:r>
               <a:rPr lang="en-US"/>
               <a:t>Item three</a:t>

</xml_diff>

<commit_message>
Don't empty parents, remove completed children
</commit_message>
<xml_diff>
--- a/output.pptx
+++ b/output.pptx
@@ -3098,29 +3098,11 @@
           <a:lstStyle/>
           <a:p>
             <a:pPr>
-              <a:buNone/>
+              <a:buAutoNum type="arabicPeriod" startAt="1"/>
             </a:pPr>
             <a:r>
               <a:rPr lang="en-US" i="true"/>
-              <a:t>One</a:t>
-            </a:r>
-          </a:p>
-          <a:p>
-            <a:pPr>
-              <a:buNone/>
-            </a:pPr>
-            <a:r>
-              <a:rPr lang="en-US" b="true"/>
-              <a:t> Two</a:t>
-            </a:r>
-          </a:p>
-          <a:p>
-            <a:pPr>
-              <a:buNone/>
-            </a:pPr>
-            <a:r>
-              <a:rPr lang="en-US" u="sng"/>
-              <a:t> Three</a:t>
+              <a:t>a</a:t>
             </a:r>
           </a:p>
           <a:p>
@@ -3129,7 +3111,7 @@
             </a:pPr>
             <a:r>
               <a:rPr lang="en-US"/>
-              <a:t>a</a:t>
+              <a:t>b</a:t>
             </a:r>
           </a:p>
           <a:p>
@@ -3138,7 +3120,7 @@
             </a:pPr>
             <a:r>
               <a:rPr lang="en-US"/>
-              <a:t>b</a:t>
+              <a:t>c</a:t>
             </a:r>
           </a:p>
           <a:p>
@@ -3147,22 +3129,60 @@
             </a:pPr>
             <a:r>
               <a:rPr lang="en-US"/>
-              <a:t>c</a:t>
+              <a:t>d</a:t>
             </a:r>
           </a:p>
           <a:p>
             <a:pPr>
-              <a:buAutoNum type="arabicPeriod" startAt="1"/>
+              <a:buNone/>
             </a:pPr>
+          </a:p>
+          <a:p>
+            <a:pPr>
+              <a:buNone/>
+            </a:pPr>
             <a:r>
               <a:rPr lang="en-US"/>
-              <a:t>d</a:t>
+              <a:t>Heading </a:t>
+            </a:r>
+            <a:r>
+              <a:rPr lang="en-US" i="true" b="true"/>
+              <a:t>OneB</a:t>
+            </a:r>
+            <a:r>
+              <a:rPr lang="en-US" i="true"/>
+              <a:t>One</a:t>
             </a:r>
           </a:p>
           <a:p>
             <a:pPr>
               <a:buNone/>
             </a:pPr>
+            <a:r>
+              <a:rPr lang="en-US" b="true"/>
+              <a:t>Heading</a:t>
+            </a:r>
+            <a:r>
+              <a:rPr lang="en-US"/>
+              <a:t> Two</a:t>
+            </a:r>
+          </a:p>
+          <a:p>
+            <a:pPr>
+              <a:buNone/>
+            </a:pPr>
+            <a:r>
+              <a:rPr lang="en-US"/>
+              <a:t>Headi</a:t>
+            </a:r>
+            <a:r>
+              <a:rPr lang="en-US" u="sng"/>
+              <a:t>ing</a:t>
+            </a:r>
+            <a:r>
+              <a:rPr lang="en-US"/>
+              <a:t> Three</a:t>
+            </a:r>
           </a:p>
           <a:p>
             <a:pPr>
@@ -3195,7 +3215,7 @@
               <a:buNone/>
             </a:pPr>
             <a:r>
-              <a:rPr lang="en-US" b="true"/>
+              <a:rPr lang="en-US"/>
               <a:t>Bold</a:t>
             </a:r>
           </a:p>

</xml_diff>